<commit_message>
Correction in PDF for Control Modes newer version of ppp
</commit_message>
<xml_diff>
--- a/powerpoint/ControlModesPDF/ControlModes.pptx
+++ b/powerpoint/ControlModesPDF/ControlModes.pptx
@@ -2771,10 +2771,10 @@
         </p:nvGrpSpPr>
         <p:grpSpPr>
           <a:xfrm>
-            <a:off x="555541" y="1138017"/>
-            <a:ext cx="2132412" cy="2244703"/>
-            <a:chOff x="780232" y="3033248"/>
-            <a:chExt cx="2252045" cy="2270869"/>
+            <a:off x="555541" y="1145214"/>
+            <a:ext cx="2162892" cy="2237506"/>
+            <a:chOff x="780232" y="3040529"/>
+            <a:chExt cx="2284235" cy="2263588"/>
           </a:xfrm>
         </p:grpSpPr>
         <p:grpSp>
@@ -3326,8 +3326,8 @@
             </p:nvSpPr>
             <p:spPr>
               <a:xfrm>
-                <a:off x="1587030" y="3505389"/>
-                <a:ext cx="407617" cy="374461"/>
+                <a:off x="1640680" y="3474554"/>
+                <a:ext cx="407616" cy="374461"/>
               </a:xfrm>
               <a:prstGeom prst="rect">
                 <a:avLst/>
@@ -3364,8 +3364,8 @@
             </p:nvSpPr>
             <p:spPr>
               <a:xfrm>
-                <a:off x="1634841" y="3762375"/>
-                <a:ext cx="407617" cy="374461"/>
+                <a:off x="1634841" y="3895995"/>
+                <a:ext cx="407616" cy="374461"/>
               </a:xfrm>
               <a:prstGeom prst="rect">
                 <a:avLst/>
@@ -3402,8 +3402,8 @@
             </p:nvSpPr>
             <p:spPr>
               <a:xfrm>
-                <a:off x="1358430" y="3986494"/>
-                <a:ext cx="407617" cy="374461"/>
+                <a:off x="1025800" y="4068722"/>
+                <a:ext cx="407616" cy="374461"/>
               </a:xfrm>
               <a:prstGeom prst="rect">
                 <a:avLst/>
@@ -3522,7 +3522,7 @@
           </p:nvSpPr>
           <p:spPr>
             <a:xfrm>
-              <a:off x="1995702" y="3250371"/>
+              <a:off x="1995702" y="3363434"/>
               <a:ext cx="407617" cy="374461"/>
             </a:xfrm>
             <a:prstGeom prst="rect">
@@ -3560,7 +3560,7 @@
           </p:nvSpPr>
           <p:spPr>
             <a:xfrm>
-              <a:off x="2145063" y="3855489"/>
+              <a:off x="2134334" y="4019944"/>
               <a:ext cx="407617" cy="374461"/>
             </a:xfrm>
             <a:prstGeom prst="rect">
@@ -3598,7 +3598,7 @@
           </p:nvSpPr>
           <p:spPr>
             <a:xfrm>
-              <a:off x="1080881" y="4451889"/>
+              <a:off x="1005771" y="4451889"/>
               <a:ext cx="407617" cy="374461"/>
             </a:xfrm>
             <a:prstGeom prst="rect">
@@ -3663,7 +3663,7 @@
           </p:nvSpPr>
           <p:spPr>
             <a:xfrm>
-              <a:off x="2347534" y="3033248"/>
+              <a:off x="2379724" y="3125754"/>
               <a:ext cx="407617" cy="374461"/>
             </a:xfrm>
             <a:prstGeom prst="rect">
@@ -3728,7 +3728,7 @@
           </p:nvSpPr>
           <p:spPr>
             <a:xfrm>
-              <a:off x="2622760" y="3843059"/>
+              <a:off x="2654950" y="3956122"/>
               <a:ext cx="409517" cy="374461"/>
             </a:xfrm>
             <a:prstGeom prst="rect">
@@ -3793,7 +3793,7 @@
           </p:nvSpPr>
           <p:spPr>
             <a:xfrm>
-              <a:off x="1065581" y="4859060"/>
+              <a:off x="1011931" y="4859060"/>
               <a:ext cx="407617" cy="374461"/>
             </a:xfrm>
             <a:prstGeom prst="rect">
@@ -3833,9 +3833,9 @@
         <p:grpSpPr>
           <a:xfrm>
             <a:off x="3038188" y="1254214"/>
-            <a:ext cx="1913662" cy="2055340"/>
+            <a:ext cx="1956690" cy="2164115"/>
             <a:chOff x="3360573" y="2827061"/>
-            <a:chExt cx="1913662" cy="2055340"/>
+            <a:chExt cx="1956690" cy="2164115"/>
           </a:xfrm>
         </p:grpSpPr>
         <p:grpSp>
@@ -4387,8 +4387,8 @@
             </p:nvSpPr>
             <p:spPr>
               <a:xfrm>
-                <a:off x="1587030" y="3505389"/>
-                <a:ext cx="407617" cy="374461"/>
+                <a:off x="1658673" y="3495177"/>
+                <a:ext cx="407296" cy="374461"/>
               </a:xfrm>
               <a:prstGeom prst="rect">
                 <a:avLst/>
@@ -4425,7 +4425,7 @@
             </p:nvSpPr>
             <p:spPr>
               <a:xfrm>
-                <a:off x="1634841" y="3762375"/>
+                <a:off x="1537149" y="3919950"/>
                 <a:ext cx="407617" cy="374461"/>
               </a:xfrm>
               <a:prstGeom prst="rect">
@@ -4463,7 +4463,7 @@
             </p:nvSpPr>
             <p:spPr>
               <a:xfrm>
-                <a:off x="1358430" y="3986494"/>
+                <a:off x="1024118" y="4024888"/>
                 <a:ext cx="407617" cy="374461"/>
               </a:xfrm>
               <a:prstGeom prst="rect">
@@ -4583,7 +4583,7 @@
           </p:nvSpPr>
           <p:spPr>
             <a:xfrm>
-              <a:off x="4842711" y="3750234"/>
+              <a:off x="4832551" y="3841674"/>
               <a:ext cx="431524" cy="374461"/>
             </a:xfrm>
             <a:prstGeom prst="rect">
@@ -4816,7 +4816,7 @@
           </p:nvSpPr>
           <p:spPr>
             <a:xfrm>
-              <a:off x="4848686" y="3420225"/>
+              <a:off x="4909646" y="3379585"/>
               <a:ext cx="407617" cy="374461"/>
             </a:xfrm>
             <a:prstGeom prst="rect">
@@ -4854,7 +4854,7 @@
           </p:nvSpPr>
           <p:spPr>
             <a:xfrm>
-              <a:off x="4014968" y="4454155"/>
+              <a:off x="4055608" y="4616715"/>
               <a:ext cx="407617" cy="374461"/>
             </a:xfrm>
             <a:prstGeom prst="rect">
@@ -5857,7 +5857,7 @@
             </p:nvSpPr>
             <p:spPr>
               <a:xfrm>
-                <a:off x="1587030" y="3505389"/>
+                <a:off x="1630158" y="3534092"/>
                 <a:ext cx="407617" cy="374461"/>
               </a:xfrm>
               <a:prstGeom prst="rect">
@@ -5895,7 +5895,7 @@
             </p:nvSpPr>
             <p:spPr>
               <a:xfrm>
-                <a:off x="1634841" y="3762375"/>
+                <a:off x="1601257" y="3924320"/>
                 <a:ext cx="407617" cy="374461"/>
               </a:xfrm>
               <a:prstGeom prst="rect">
@@ -5933,7 +5933,7 @@
             </p:nvSpPr>
             <p:spPr>
               <a:xfrm>
-                <a:off x="1358430" y="3986494"/>
+                <a:off x="1039562" y="3987296"/>
                 <a:ext cx="407617" cy="374461"/>
               </a:xfrm>
               <a:prstGeom prst="rect">
@@ -6053,7 +6053,7 @@
           </p:nvSpPr>
           <p:spPr>
             <a:xfrm>
-              <a:off x="7411098" y="3039225"/>
+              <a:off x="7431418" y="3130665"/>
               <a:ext cx="407617" cy="374461"/>
             </a:xfrm>
             <a:prstGeom prst="rect">
@@ -6091,7 +6091,7 @@
           </p:nvSpPr>
           <p:spPr>
             <a:xfrm>
-              <a:off x="7720380" y="3565155"/>
+              <a:off x="7740700" y="3676915"/>
               <a:ext cx="407617" cy="374461"/>
             </a:xfrm>
             <a:prstGeom prst="rect">
@@ -6129,7 +6129,7 @@
           </p:nvSpPr>
           <p:spPr>
             <a:xfrm>
-              <a:off x="6968839" y="4606555"/>
+              <a:off x="6887559" y="4637035"/>
               <a:ext cx="407617" cy="374461"/>
             </a:xfrm>
             <a:prstGeom prst="rect">
@@ -6186,7 +6186,6 @@
               <a:rPr lang="de-DE" dirty="0" smtClean="0"/>
               <a:t>Testphase</a:t>
             </a:r>
-            <a:endParaRPr lang="de-DE" dirty="0" smtClean="0"/>
           </a:p>
           <a:p>
             <a:r>
@@ -6197,300 +6196,547 @@
           </a:p>
         </p:txBody>
       </p:sp>
-      <p:sp>
-        <p:nvSpPr>
-          <p:cNvPr id="135" name="Textfeld 134"/>
-          <p:cNvSpPr txBox="1"/>
-          <p:nvPr/>
-        </p:nvSpPr>
-        <p:spPr>
-          <a:xfrm>
-            <a:off x="1375998" y="4161023"/>
-            <a:ext cx="357101" cy="374461"/>
-          </a:xfrm>
-          <a:prstGeom prst="rect">
-            <a:avLst/>
-          </a:prstGeom>
-          <a:noFill/>
-        </p:spPr>
-        <p:txBody>
-          <a:bodyPr wrap="square" rtlCol="0">
-            <a:spAutoFit/>
-          </a:bodyPr>
-          <a:lstStyle/>
-          <a:p>
-            <a:r>
-              <a:rPr lang="de-DE" sz="1000" dirty="0" smtClean="0"/>
-              <a:t>T</a:t>
-            </a:r>
-            <a:r>
-              <a:rPr lang="de-DE" sz="1000" baseline="-25000" dirty="0" smtClean="0"/>
-              <a:t>1</a:t>
-            </a:r>
-            <a:endParaRPr lang="de-DE" sz="1000" baseline="-25000" dirty="0"/>
-          </a:p>
-        </p:txBody>
-      </p:sp>
       <p:grpSp>
         <p:nvGrpSpPr>
-          <p:cNvPr id="21515" name="Gruppierung 21514"/>
+          <p:cNvPr id="3" name="Gruppierung 2"/>
           <p:cNvGrpSpPr/>
           <p:nvPr/>
         </p:nvGrpSpPr>
         <p:grpSpPr>
           <a:xfrm>
-            <a:off x="450622" y="4373009"/>
-            <a:ext cx="1458702" cy="1342467"/>
-            <a:chOff x="450622" y="4373009"/>
-            <a:chExt cx="1458702" cy="1342467"/>
+            <a:off x="420142" y="4262623"/>
+            <a:ext cx="1536477" cy="1402053"/>
+            <a:chOff x="420142" y="4262623"/>
+            <a:chExt cx="1536477" cy="1402053"/>
           </a:xfrm>
         </p:grpSpPr>
+        <p:sp>
+          <p:nvSpPr>
+            <p:cNvPr id="135" name="Textfeld 134"/>
+            <p:cNvSpPr txBox="1"/>
+            <p:nvPr/>
+          </p:nvSpPr>
+          <p:spPr>
+            <a:xfrm>
+              <a:off x="1599518" y="4262623"/>
+              <a:ext cx="357101" cy="374461"/>
+            </a:xfrm>
+            <a:prstGeom prst="rect">
+              <a:avLst/>
+            </a:prstGeom>
+            <a:noFill/>
+          </p:spPr>
+          <p:txBody>
+            <a:bodyPr wrap="square" rtlCol="0">
+              <a:spAutoFit/>
+            </a:bodyPr>
+            <a:lstStyle/>
+            <a:p>
+              <a:r>
+                <a:rPr lang="de-DE" sz="1000" dirty="0" smtClean="0"/>
+                <a:t>T</a:t>
+              </a:r>
+              <a:r>
+                <a:rPr lang="de-DE" sz="1000" baseline="-25000" dirty="0" smtClean="0"/>
+                <a:t>1</a:t>
+              </a:r>
+              <a:endParaRPr lang="de-DE" sz="1000" baseline="-25000" dirty="0"/>
+            </a:p>
+          </p:txBody>
+        </p:sp>
         <p:grpSp>
           <p:nvGrpSpPr>
-            <p:cNvPr id="133" name="Gruppierung 132"/>
+            <p:cNvPr id="21515" name="Gruppierung 21514"/>
             <p:cNvGrpSpPr/>
             <p:nvPr/>
           </p:nvGrpSpPr>
           <p:grpSpPr>
             <a:xfrm>
-              <a:off x="666331" y="4373009"/>
-              <a:ext cx="1242993" cy="1169718"/>
-              <a:chOff x="780232" y="3276887"/>
-              <a:chExt cx="1312728" cy="1183353"/>
+              <a:off x="420142" y="4373009"/>
+              <a:ext cx="1489182" cy="1291667"/>
+              <a:chOff x="420142" y="4373009"/>
+              <a:chExt cx="1489182" cy="1291667"/>
             </a:xfrm>
           </p:grpSpPr>
           <p:grpSp>
             <p:nvGrpSpPr>
-              <p:cNvPr id="161" name="Gruppieren 48"/>
+              <p:cNvPr id="133" name="Gruppierung 132"/>
               <p:cNvGrpSpPr/>
               <p:nvPr/>
             </p:nvGrpSpPr>
             <p:grpSpPr>
               <a:xfrm>
-                <a:off x="780232" y="3276887"/>
-                <a:ext cx="1312728" cy="1183353"/>
-                <a:chOff x="1204690" y="3091544"/>
-                <a:chExt cx="587823" cy="566065"/>
+                <a:off x="666331" y="4373009"/>
+                <a:ext cx="1242993" cy="1169718"/>
+                <a:chOff x="780232" y="3276887"/>
+                <a:chExt cx="1312728" cy="1183353"/>
               </a:xfrm>
             </p:grpSpPr>
-            <p:sp>
-              <p:nvSpPr>
-                <p:cNvPr id="169" name="Ellipse 49"/>
-                <p:cNvSpPr/>
+            <p:grpSp>
+              <p:nvGrpSpPr>
+                <p:cNvPr id="161" name="Gruppieren 48"/>
+                <p:cNvGrpSpPr/>
                 <p:nvPr/>
-              </p:nvSpPr>
+              </p:nvGrpSpPr>
+              <p:grpSpPr>
+                <a:xfrm>
+                  <a:off x="780232" y="3276887"/>
+                  <a:ext cx="1312728" cy="1183353"/>
+                  <a:chOff x="1204690" y="3091544"/>
+                  <a:chExt cx="587823" cy="566065"/>
+                </a:xfrm>
+              </p:grpSpPr>
+              <p:sp>
+                <p:nvSpPr>
+                  <p:cNvPr id="169" name="Ellipse 49"/>
+                  <p:cNvSpPr/>
+                  <p:nvPr/>
+                </p:nvSpPr>
+                <p:spPr bwMode="auto">
+                  <a:xfrm rot="5400000">
+                    <a:off x="1669142" y="3439890"/>
+                    <a:ext cx="87086" cy="159657"/>
+                  </a:xfrm>
+                  <a:prstGeom prst="ellipse">
+                    <a:avLst/>
+                  </a:prstGeom>
+                  <a:gradFill>
+                    <a:gsLst>
+                      <a:gs pos="0">
+                        <a:schemeClr val="accent1">
+                          <a:lumMod val="50000"/>
+                          <a:lumOff val="50000"/>
+                          <a:alpha val="72000"/>
+                        </a:schemeClr>
+                      </a:gs>
+                      <a:gs pos="39999">
+                        <a:schemeClr val="accent1">
+                          <a:lumMod val="75000"/>
+                          <a:lumOff val="25000"/>
+                        </a:schemeClr>
+                      </a:gs>
+                    </a:gsLst>
+                    <a:lin ang="0" scaled="0"/>
+                  </a:gradFill>
+                  <a:ln w="9525" cap="flat" cmpd="sng" algn="ctr">
+                    <a:solidFill>
+                      <a:schemeClr val="accent1">
+                        <a:alpha val="38000"/>
+                      </a:schemeClr>
+                    </a:solidFill>
+                    <a:prstDash val="solid"/>
+                    <a:round/>
+                    <a:headEnd type="none" w="med" len="med"/>
+                    <a:tailEnd type="none" w="med" len="med"/>
+                  </a:ln>
+                  <a:effectLst/>
+                  <a:scene3d>
+                    <a:camera prst="orthographicFront">
+                      <a:rot lat="0" lon="0" rev="19800000"/>
+                    </a:camera>
+                    <a:lightRig rig="threePt" dir="t"/>
+                  </a:scene3d>
+                </p:spPr>
+                <p:txBody>
+                  <a:bodyPr vert="horz" wrap="square" lIns="0" tIns="36000" rIns="0" bIns="36000" numCol="1" rtlCol="0" anchor="ctr" anchorCtr="1" compatLnSpc="1">
+                    <a:prstTxWarp prst="textNoShape">
+                      <a:avLst/>
+                    </a:prstTxWarp>
+                  </a:bodyPr>
+                  <a:lstStyle/>
+                  <a:p>
+                    <a:pPr marL="0" marR="0" indent="0" algn="l" defTabSz="457200" rtl="0" eaLnBrk="1" fontAlgn="base" latinLnBrk="0" hangingPunct="1">
+                      <a:lnSpc>
+                        <a:spcPts val="2400"/>
+                      </a:lnSpc>
+                      <a:spcBef>
+                        <a:spcPts val="600"/>
+                      </a:spcBef>
+                      <a:spcAft>
+                        <a:spcPct val="0"/>
+                      </a:spcAft>
+                      <a:buClr>
+                        <a:srgbClr val="2A6AB3"/>
+                      </a:buClr>
+                      <a:buSzPct val="110000"/>
+                      <a:buFont typeface="Wingdings" pitchFamily="16" charset="2"/>
+                      <a:buNone/>
+                      <a:tabLst/>
+                    </a:pPr>
+                    <a:endParaRPr kumimoji="0" lang="de-CH" sz="2000" b="0" i="0" u="none" strike="noStrike" cap="none" normalizeH="0" baseline="0" dirty="0" smtClean="0">
+                      <a:ln>
+                        <a:noFill/>
+                      </a:ln>
+                      <a:solidFill>
+                        <a:srgbClr val="000000"/>
+                      </a:solidFill>
+                      <a:effectLst/>
+                      <a:latin typeface="Arial" charset="0"/>
+                    </a:endParaRPr>
+                  </a:p>
+                </p:txBody>
+              </p:sp>
+              <p:sp>
+                <p:nvSpPr>
+                  <p:cNvPr id="170" name="Ellipse 50"/>
+                  <p:cNvSpPr/>
+                  <p:nvPr/>
+                </p:nvSpPr>
+                <p:spPr bwMode="auto">
+                  <a:xfrm rot="5400000">
+                    <a:off x="1240976" y="3505200"/>
+                    <a:ext cx="87086" cy="159657"/>
+                  </a:xfrm>
+                  <a:prstGeom prst="ellipse">
+                    <a:avLst/>
+                  </a:prstGeom>
+                  <a:gradFill>
+                    <a:gsLst>
+                      <a:gs pos="0">
+                        <a:schemeClr val="accent1">
+                          <a:lumMod val="50000"/>
+                          <a:lumOff val="50000"/>
+                          <a:alpha val="10000"/>
+                        </a:schemeClr>
+                      </a:gs>
+                      <a:gs pos="39999">
+                        <a:schemeClr val="accent1">
+                          <a:lumMod val="75000"/>
+                          <a:lumOff val="25000"/>
+                        </a:schemeClr>
+                      </a:gs>
+                    </a:gsLst>
+                    <a:lin ang="0" scaled="0"/>
+                  </a:gradFill>
+                  <a:ln w="9525" cap="flat" cmpd="sng" algn="ctr">
+                    <a:solidFill>
+                      <a:schemeClr val="accent1">
+                        <a:alpha val="38000"/>
+                      </a:schemeClr>
+                    </a:solidFill>
+                    <a:prstDash val="solid"/>
+                    <a:round/>
+                    <a:headEnd type="none" w="med" len="med"/>
+                    <a:tailEnd type="none" w="med" len="med"/>
+                  </a:ln>
+                  <a:effectLst/>
+                  <a:scene3d>
+                    <a:camera prst="orthographicFront">
+                      <a:rot lat="0" lon="0" rev="1800000"/>
+                    </a:camera>
+                    <a:lightRig rig="threePt" dir="t"/>
+                  </a:scene3d>
+                </p:spPr>
+                <p:txBody>
+                  <a:bodyPr vert="horz" wrap="square" lIns="0" tIns="36000" rIns="0" bIns="36000" numCol="1" rtlCol="0" anchor="ctr" anchorCtr="1" compatLnSpc="1">
+                    <a:prstTxWarp prst="textNoShape">
+                      <a:avLst/>
+                    </a:prstTxWarp>
+                  </a:bodyPr>
+                  <a:lstStyle/>
+                  <a:p>
+                    <a:pPr marL="0" marR="0" indent="0" algn="l" defTabSz="457200" rtl="0" eaLnBrk="1" fontAlgn="base" latinLnBrk="0" hangingPunct="1">
+                      <a:lnSpc>
+                        <a:spcPts val="2400"/>
+                      </a:lnSpc>
+                      <a:spcBef>
+                        <a:spcPts val="600"/>
+                      </a:spcBef>
+                      <a:spcAft>
+                        <a:spcPct val="0"/>
+                      </a:spcAft>
+                      <a:buClr>
+                        <a:srgbClr val="2A6AB3"/>
+                      </a:buClr>
+                      <a:buSzPct val="110000"/>
+                      <a:buFont typeface="Wingdings" pitchFamily="16" charset="2"/>
+                      <a:buNone/>
+                      <a:tabLst/>
+                    </a:pPr>
+                    <a:endParaRPr kumimoji="0" lang="de-CH" sz="2000" b="0" i="0" u="none" strike="noStrike" cap="none" normalizeH="0" baseline="0" dirty="0" smtClean="0">
+                      <a:ln>
+                        <a:noFill/>
+                      </a:ln>
+                      <a:solidFill>
+                        <a:srgbClr val="000000"/>
+                      </a:solidFill>
+                      <a:effectLst/>
+                      <a:latin typeface="Arial" charset="0"/>
+                    </a:endParaRPr>
+                  </a:p>
+                </p:txBody>
+              </p:sp>
+              <p:sp>
+                <p:nvSpPr>
+                  <p:cNvPr id="171" name="Ellipse 51"/>
+                  <p:cNvSpPr/>
+                  <p:nvPr/>
+                </p:nvSpPr>
+                <p:spPr bwMode="auto">
+                  <a:xfrm>
+                    <a:off x="1219200" y="3135094"/>
+                    <a:ext cx="522515" cy="522515"/>
+                  </a:xfrm>
+                  <a:prstGeom prst="ellipse">
+                    <a:avLst/>
+                  </a:prstGeom>
+                  <a:gradFill>
+                    <a:gsLst>
+                      <a:gs pos="0">
+                        <a:srgbClr val="5E9EFF">
+                          <a:alpha val="61000"/>
+                        </a:srgbClr>
+                      </a:gs>
+                      <a:gs pos="39999">
+                        <a:srgbClr val="85C2FF"/>
+                      </a:gs>
+                      <a:gs pos="70000">
+                        <a:srgbClr val="C4D6EB"/>
+                      </a:gs>
+                      <a:gs pos="100000">
+                        <a:srgbClr val="FFEBFA"/>
+                      </a:gs>
+                    </a:gsLst>
+                    <a:lin ang="0" scaled="0"/>
+                  </a:gradFill>
+                  <a:ln w="9525" cap="flat" cmpd="sng" algn="ctr">
+                    <a:solidFill>
+                      <a:schemeClr val="accent1">
+                        <a:alpha val="38000"/>
+                      </a:schemeClr>
+                    </a:solidFill>
+                    <a:prstDash val="solid"/>
+                    <a:round/>
+                    <a:headEnd type="none" w="med" len="med"/>
+                    <a:tailEnd type="none" w="med" len="med"/>
+                  </a:ln>
+                  <a:effectLst/>
+                </p:spPr>
+                <p:txBody>
+                  <a:bodyPr vert="horz" wrap="square" lIns="0" tIns="36000" rIns="0" bIns="36000" numCol="1" rtlCol="0" anchor="ctr" anchorCtr="1" compatLnSpc="1">
+                    <a:prstTxWarp prst="textNoShape">
+                      <a:avLst/>
+                    </a:prstTxWarp>
+                  </a:bodyPr>
+                  <a:lstStyle/>
+                  <a:p>
+                    <a:pPr marL="0" marR="0" indent="0" algn="l" defTabSz="457200" rtl="0" eaLnBrk="1" fontAlgn="base" latinLnBrk="0" hangingPunct="1">
+                      <a:lnSpc>
+                        <a:spcPts val="2400"/>
+                      </a:lnSpc>
+                      <a:spcBef>
+                        <a:spcPts val="600"/>
+                      </a:spcBef>
+                      <a:spcAft>
+                        <a:spcPct val="0"/>
+                      </a:spcAft>
+                      <a:buClr>
+                        <a:srgbClr val="2A6AB3"/>
+                      </a:buClr>
+                      <a:buSzPct val="110000"/>
+                      <a:buFont typeface="Wingdings" pitchFamily="16" charset="2"/>
+                      <a:buNone/>
+                      <a:tabLst/>
+                    </a:pPr>
+                    <a:endParaRPr kumimoji="0" lang="de-CH" sz="2000" b="0" i="0" u="none" strike="noStrike" cap="none" normalizeH="0" baseline="0" dirty="0" smtClean="0">
+                      <a:ln>
+                        <a:noFill/>
+                      </a:ln>
+                      <a:solidFill>
+                        <a:srgbClr val="000000"/>
+                      </a:solidFill>
+                      <a:effectLst/>
+                      <a:latin typeface="Arial" charset="0"/>
+                    </a:endParaRPr>
+                  </a:p>
+                </p:txBody>
+              </p:sp>
+              <p:sp>
+                <p:nvSpPr>
+                  <p:cNvPr id="172" name="Ellipse 52"/>
+                  <p:cNvSpPr/>
+                  <p:nvPr/>
+                </p:nvSpPr>
+                <p:spPr bwMode="auto">
+                  <a:xfrm>
+                    <a:off x="1436914" y="3091544"/>
+                    <a:ext cx="87086" cy="159657"/>
+                  </a:xfrm>
+                  <a:prstGeom prst="ellipse">
+                    <a:avLst/>
+                  </a:prstGeom>
+                  <a:gradFill>
+                    <a:gsLst>
+                      <a:gs pos="0">
+                        <a:schemeClr val="accent1">
+                          <a:lumMod val="50000"/>
+                          <a:lumOff val="50000"/>
+                          <a:alpha val="72000"/>
+                        </a:schemeClr>
+                      </a:gs>
+                      <a:gs pos="39999">
+                        <a:schemeClr val="accent1">
+                          <a:lumMod val="75000"/>
+                          <a:lumOff val="25000"/>
+                        </a:schemeClr>
+                      </a:gs>
+                    </a:gsLst>
+                    <a:lin ang="0" scaled="0"/>
+                  </a:gradFill>
+                  <a:ln w="9525" cap="flat" cmpd="sng" algn="ctr">
+                    <a:solidFill>
+                      <a:schemeClr val="accent1">
+                        <a:alpha val="38000"/>
+                      </a:schemeClr>
+                    </a:solidFill>
+                    <a:prstDash val="solid"/>
+                    <a:round/>
+                    <a:headEnd type="none" w="med" len="med"/>
+                    <a:tailEnd type="none" w="med" len="med"/>
+                  </a:ln>
+                  <a:effectLst/>
+                </p:spPr>
+                <p:txBody>
+                  <a:bodyPr vert="horz" wrap="square" lIns="0" tIns="36000" rIns="0" bIns="36000" numCol="1" rtlCol="0" anchor="ctr" anchorCtr="1" compatLnSpc="1">
+                    <a:prstTxWarp prst="textNoShape">
+                      <a:avLst/>
+                    </a:prstTxWarp>
+                  </a:bodyPr>
+                  <a:lstStyle/>
+                  <a:p>
+                    <a:pPr marL="0" marR="0" indent="0" algn="l" defTabSz="457200" rtl="0" eaLnBrk="1" fontAlgn="base" latinLnBrk="0" hangingPunct="1">
+                      <a:lnSpc>
+                        <a:spcPts val="2400"/>
+                      </a:lnSpc>
+                      <a:spcBef>
+                        <a:spcPts val="600"/>
+                      </a:spcBef>
+                      <a:spcAft>
+                        <a:spcPct val="0"/>
+                      </a:spcAft>
+                      <a:buClr>
+                        <a:srgbClr val="2A6AB3"/>
+                      </a:buClr>
+                      <a:buSzPct val="110000"/>
+                      <a:buFont typeface="Wingdings" pitchFamily="16" charset="2"/>
+                      <a:buNone/>
+                      <a:tabLst/>
+                    </a:pPr>
+                    <a:endParaRPr kumimoji="0" lang="de-CH" sz="2000" b="0" i="0" u="none" strike="noStrike" cap="none" normalizeH="0" baseline="0" dirty="0" smtClean="0">
+                      <a:ln>
+                        <a:noFill/>
+                      </a:ln>
+                      <a:solidFill>
+                        <a:srgbClr val="000000"/>
+                      </a:solidFill>
+                      <a:effectLst/>
+                      <a:latin typeface="Arial" charset="0"/>
+                    </a:endParaRPr>
+                  </a:p>
+                </p:txBody>
+              </p:sp>
+            </p:grpSp>
+            <p:cxnSp>
+              <p:nvCxnSpPr>
+                <p:cNvPr id="162" name="Gerade Verbindung mit Pfeil 161"/>
+                <p:cNvCxnSpPr/>
+                <p:nvPr/>
+              </p:nvCxnSpPr>
               <p:spPr bwMode="auto">
-                <a:xfrm rot="5400000">
-                  <a:off x="1669142" y="3439890"/>
-                  <a:ext cx="87086" cy="159657"/>
+                <a:xfrm>
+                  <a:off x="1415507" y="3469657"/>
+                  <a:ext cx="2236" cy="233354"/>
                 </a:xfrm>
-                <a:prstGeom prst="ellipse">
+                <a:prstGeom prst="straightConnector1">
                   <a:avLst/>
                 </a:prstGeom>
-                <a:gradFill>
-                  <a:gsLst>
-                    <a:gs pos="0">
-                      <a:schemeClr val="accent1">
-                        <a:lumMod val="50000"/>
-                        <a:lumOff val="50000"/>
-                        <a:alpha val="72000"/>
-                      </a:schemeClr>
-                    </a:gs>
-                    <a:gs pos="39999">
-                      <a:schemeClr val="accent1">
-                        <a:lumMod val="75000"/>
-                        <a:lumOff val="25000"/>
-                      </a:schemeClr>
-                    </a:gs>
-                  </a:gsLst>
-                  <a:lin ang="0" scaled="0"/>
-                </a:gradFill>
-                <a:ln w="9525" cap="flat" cmpd="sng" algn="ctr">
+                <a:noFill/>
+                <a:ln w="15875" cap="flat" cmpd="sng" algn="ctr">
                   <a:solidFill>
-                    <a:schemeClr val="accent1">
-                      <a:alpha val="38000"/>
-                    </a:schemeClr>
+                    <a:schemeClr val="accent1"/>
                   </a:solidFill>
                   <a:prstDash val="solid"/>
                   <a:round/>
-                  <a:headEnd type="none" w="med" len="med"/>
-                  <a:tailEnd type="none" w="med" len="med"/>
+                  <a:headEnd type="none" w="lg" len="med"/>
+                  <a:tailEnd type="none"/>
                 </a:ln>
                 <a:effectLst/>
-                <a:scene3d>
-                  <a:camera prst="orthographicFront">
-                    <a:rot lat="0" lon="0" rev="19800000"/>
-                  </a:camera>
-                  <a:lightRig rig="threePt" dir="t"/>
-                </a:scene3d>
               </p:spPr>
-              <p:txBody>
-                <a:bodyPr vert="horz" wrap="square" lIns="0" tIns="36000" rIns="0" bIns="36000" numCol="1" rtlCol="0" anchor="ctr" anchorCtr="1" compatLnSpc="1">
-                  <a:prstTxWarp prst="textNoShape">
-                    <a:avLst/>
-                  </a:prstTxWarp>
-                </a:bodyPr>
-                <a:lstStyle/>
-                <a:p>
-                  <a:pPr marL="0" marR="0" indent="0" algn="l" defTabSz="457200" rtl="0" eaLnBrk="1" fontAlgn="base" latinLnBrk="0" hangingPunct="1">
-                    <a:lnSpc>
-                      <a:spcPts val="2400"/>
-                    </a:lnSpc>
-                    <a:spcBef>
-                      <a:spcPts val="600"/>
-                    </a:spcBef>
-                    <a:spcAft>
-                      <a:spcPct val="0"/>
-                    </a:spcAft>
-                    <a:buClr>
-                      <a:srgbClr val="2A6AB3"/>
-                    </a:buClr>
-                    <a:buSzPct val="110000"/>
-                    <a:buFont typeface="Wingdings" pitchFamily="16" charset="2"/>
-                    <a:buNone/>
-                    <a:tabLst/>
-                  </a:pPr>
-                  <a:endParaRPr kumimoji="0" lang="de-CH" sz="2000" b="0" i="0" u="none" strike="noStrike" cap="none" normalizeH="0" baseline="0" dirty="0" smtClean="0">
-                    <a:ln>
-                      <a:noFill/>
-                    </a:ln>
-                    <a:solidFill>
-                      <a:srgbClr val="000000"/>
-                    </a:solidFill>
-                    <a:effectLst/>
-                    <a:latin typeface="Arial" charset="0"/>
-                  </a:endParaRPr>
-                </a:p>
-              </p:txBody>
-            </p:sp>
-            <p:sp>
-              <p:nvSpPr>
-                <p:cNvPr id="170" name="Ellipse 50"/>
-                <p:cNvSpPr/>
+            </p:cxnSp>
+            <p:cxnSp>
+              <p:nvCxnSpPr>
+                <p:cNvPr id="166" name="Gerade Verbindung mit Pfeil 165"/>
+                <p:cNvCxnSpPr/>
                 <p:nvPr/>
-              </p:nvSpPr>
+              </p:nvCxnSpPr>
               <p:spPr bwMode="auto">
-                <a:xfrm rot="5400000">
-                  <a:off x="1240976" y="3505200"/>
-                  <a:ext cx="87086" cy="159657"/>
+                <a:xfrm flipH="1" flipV="1">
+                  <a:off x="1711970" y="4072717"/>
+                  <a:ext cx="206190" cy="103396"/>
                 </a:xfrm>
-                <a:prstGeom prst="ellipse">
+                <a:prstGeom prst="straightConnector1">
                   <a:avLst/>
                 </a:prstGeom>
-                <a:gradFill>
-                  <a:gsLst>
-                    <a:gs pos="0">
-                      <a:schemeClr val="accent1">
-                        <a:lumMod val="50000"/>
-                        <a:lumOff val="50000"/>
-                        <a:alpha val="10000"/>
-                      </a:schemeClr>
-                    </a:gs>
-                    <a:gs pos="39999">
-                      <a:schemeClr val="accent1">
-                        <a:lumMod val="75000"/>
-                        <a:lumOff val="25000"/>
-                      </a:schemeClr>
-                    </a:gs>
-                  </a:gsLst>
-                  <a:lin ang="0" scaled="0"/>
-                </a:gradFill>
-                <a:ln w="9525" cap="flat" cmpd="sng" algn="ctr">
+                <a:noFill/>
+                <a:ln w="15875" cap="flat" cmpd="sng" algn="ctr">
                   <a:solidFill>
-                    <a:schemeClr val="accent1">
-                      <a:alpha val="38000"/>
-                    </a:schemeClr>
+                    <a:schemeClr val="accent1"/>
                   </a:solidFill>
                   <a:prstDash val="solid"/>
                   <a:round/>
-                  <a:headEnd type="none" w="med" len="med"/>
-                  <a:tailEnd type="none" w="med" len="med"/>
+                  <a:headEnd type="none" w="lg" len="med"/>
+                  <a:tailEnd type="none"/>
                 </a:ln>
                 <a:effectLst/>
-                <a:scene3d>
-                  <a:camera prst="orthographicFront">
-                    <a:rot lat="0" lon="0" rev="1800000"/>
-                  </a:camera>
-                  <a:lightRig rig="threePt" dir="t"/>
-                </a:scene3d>
               </p:spPr>
-              <p:txBody>
-                <a:bodyPr vert="horz" wrap="square" lIns="0" tIns="36000" rIns="0" bIns="36000" numCol="1" rtlCol="0" anchor="ctr" anchorCtr="1" compatLnSpc="1">
-                  <a:prstTxWarp prst="textNoShape">
-                    <a:avLst/>
-                  </a:prstTxWarp>
-                </a:bodyPr>
-                <a:lstStyle/>
-                <a:p>
-                  <a:pPr marL="0" marR="0" indent="0" algn="l" defTabSz="457200" rtl="0" eaLnBrk="1" fontAlgn="base" latinLnBrk="0" hangingPunct="1">
-                    <a:lnSpc>
-                      <a:spcPts val="2400"/>
-                    </a:lnSpc>
-                    <a:spcBef>
-                      <a:spcPts val="600"/>
-                    </a:spcBef>
-                    <a:spcAft>
-                      <a:spcPct val="0"/>
-                    </a:spcAft>
-                    <a:buClr>
-                      <a:srgbClr val="2A6AB3"/>
-                    </a:buClr>
-                    <a:buSzPct val="110000"/>
-                    <a:buFont typeface="Wingdings" pitchFamily="16" charset="2"/>
-                    <a:buNone/>
-                    <a:tabLst/>
-                  </a:pPr>
-                  <a:endParaRPr kumimoji="0" lang="de-CH" sz="2000" b="0" i="0" u="none" strike="noStrike" cap="none" normalizeH="0" baseline="0" dirty="0" smtClean="0">
-                    <a:ln>
-                      <a:noFill/>
-                    </a:ln>
-                    <a:solidFill>
-                      <a:srgbClr val="000000"/>
-                    </a:solidFill>
-                    <a:effectLst/>
-                    <a:latin typeface="Arial" charset="0"/>
-                  </a:endParaRPr>
-                </a:p>
-              </p:txBody>
-            </p:sp>
+            </p:cxnSp>
+            <p:cxnSp>
+              <p:nvCxnSpPr>
+                <p:cNvPr id="167" name="Gerade Verbindung mit Pfeil 166"/>
+                <p:cNvCxnSpPr/>
+                <p:nvPr/>
+              </p:nvCxnSpPr>
+              <p:spPr bwMode="auto">
+                <a:xfrm flipV="1">
+                  <a:off x="987713" y="4178870"/>
+                  <a:ext cx="219866" cy="110697"/>
+                </a:xfrm>
+                <a:prstGeom prst="straightConnector1">
+                  <a:avLst/>
+                </a:prstGeom>
+                <a:noFill/>
+                <a:ln w="15875" cap="flat" cmpd="sng" algn="ctr">
+                  <a:solidFill>
+                    <a:schemeClr val="accent1"/>
+                  </a:solidFill>
+                  <a:prstDash val="solid"/>
+                  <a:round/>
+                  <a:headEnd type="none" w="lg" len="med"/>
+                  <a:tailEnd type="none"/>
+                </a:ln>
+                <a:effectLst/>
+              </p:spPr>
+            </p:cxnSp>
             <p:sp>
               <p:nvSpPr>
-                <p:cNvPr id="171" name="Ellipse 51"/>
+                <p:cNvPr id="168" name="Oval 167"/>
                 <p:cNvSpPr/>
                 <p:nvPr/>
               </p:nvSpPr>
               <p:spPr bwMode="auto">
                 <a:xfrm>
-                  <a:off x="1219200" y="3135094"/>
-                  <a:ext cx="522515" cy="522515"/>
+                  <a:off x="1367078" y="3416853"/>
+                  <a:ext cx="86095" cy="81583"/>
                 </a:xfrm>
                 <a:prstGeom prst="ellipse">
                   <a:avLst/>
                 </a:prstGeom>
-                <a:gradFill>
-                  <a:gsLst>
-                    <a:gs pos="0">
-                      <a:srgbClr val="5E9EFF">
-                        <a:alpha val="61000"/>
-                      </a:srgbClr>
-                    </a:gs>
-                    <a:gs pos="39999">
-                      <a:srgbClr val="85C2FF"/>
-                    </a:gs>
-                    <a:gs pos="70000">
-                      <a:srgbClr val="C4D6EB"/>
-                    </a:gs>
-                    <a:gs pos="100000">
-                      <a:srgbClr val="FFEBFA"/>
-                    </a:gs>
-                  </a:gsLst>
-                  <a:lin ang="0" scaled="0"/>
-                </a:gradFill>
+                <a:solidFill>
+                  <a:schemeClr val="tx1"/>
+                </a:solidFill>
                 <a:ln w="9525" cap="flat" cmpd="sng" algn="ctr">
                   <a:solidFill>
-                    <a:schemeClr val="accent1">
-                      <a:alpha val="38000"/>
-                    </a:schemeClr>
+                    <a:schemeClr val="tx1"/>
                   </a:solidFill>
                   <a:prstDash val="solid"/>
                   <a:round/>
@@ -6525,91 +6771,7 @@
                     <a:buNone/>
                     <a:tabLst/>
                   </a:pPr>
-                  <a:endParaRPr kumimoji="0" lang="de-CH" sz="2000" b="0" i="0" u="none" strike="noStrike" cap="none" normalizeH="0" baseline="0" dirty="0" smtClean="0">
-                    <a:ln>
-                      <a:noFill/>
-                    </a:ln>
-                    <a:solidFill>
-                      <a:srgbClr val="000000"/>
-                    </a:solidFill>
-                    <a:effectLst/>
-                    <a:latin typeface="Arial" charset="0"/>
-                  </a:endParaRPr>
-                </a:p>
-              </p:txBody>
-            </p:sp>
-            <p:sp>
-              <p:nvSpPr>
-                <p:cNvPr id="172" name="Ellipse 52"/>
-                <p:cNvSpPr/>
-                <p:nvPr/>
-              </p:nvSpPr>
-              <p:spPr bwMode="auto">
-                <a:xfrm>
-                  <a:off x="1436914" y="3091544"/>
-                  <a:ext cx="87086" cy="159657"/>
-                </a:xfrm>
-                <a:prstGeom prst="ellipse">
-                  <a:avLst/>
-                </a:prstGeom>
-                <a:gradFill>
-                  <a:gsLst>
-                    <a:gs pos="0">
-                      <a:schemeClr val="accent1">
-                        <a:lumMod val="50000"/>
-                        <a:lumOff val="50000"/>
-                        <a:alpha val="72000"/>
-                      </a:schemeClr>
-                    </a:gs>
-                    <a:gs pos="39999">
-                      <a:schemeClr val="accent1">
-                        <a:lumMod val="75000"/>
-                        <a:lumOff val="25000"/>
-                      </a:schemeClr>
-                    </a:gs>
-                  </a:gsLst>
-                  <a:lin ang="0" scaled="0"/>
-                </a:gradFill>
-                <a:ln w="9525" cap="flat" cmpd="sng" algn="ctr">
-                  <a:solidFill>
-                    <a:schemeClr val="accent1">
-                      <a:alpha val="38000"/>
-                    </a:schemeClr>
-                  </a:solidFill>
-                  <a:prstDash val="solid"/>
-                  <a:round/>
-                  <a:headEnd type="none" w="med" len="med"/>
-                  <a:tailEnd type="none" w="med" len="med"/>
-                </a:ln>
-                <a:effectLst/>
-              </p:spPr>
-              <p:txBody>
-                <a:bodyPr vert="horz" wrap="square" lIns="0" tIns="36000" rIns="0" bIns="36000" numCol="1" rtlCol="0" anchor="ctr" anchorCtr="1" compatLnSpc="1">
-                  <a:prstTxWarp prst="textNoShape">
-                    <a:avLst/>
-                  </a:prstTxWarp>
-                </a:bodyPr>
-                <a:lstStyle/>
-                <a:p>
-                  <a:pPr marL="0" marR="0" indent="0" algn="l" defTabSz="457200" rtl="0" eaLnBrk="1" fontAlgn="base" latinLnBrk="0" hangingPunct="1">
-                    <a:lnSpc>
-                      <a:spcPts val="2400"/>
-                    </a:lnSpc>
-                    <a:spcBef>
-                      <a:spcPts val="600"/>
-                    </a:spcBef>
-                    <a:spcAft>
-                      <a:spcPct val="0"/>
-                    </a:spcAft>
-                    <a:buClr>
-                      <a:srgbClr val="2A6AB3"/>
-                    </a:buClr>
-                    <a:buSzPct val="110000"/>
-                    <a:buFont typeface="Wingdings" pitchFamily="16" charset="2"/>
-                    <a:buNone/>
-                    <a:tabLst/>
-                  </a:pPr>
-                  <a:endParaRPr kumimoji="0" lang="de-CH" sz="2000" b="0" i="0" u="none" strike="noStrike" cap="none" normalizeH="0" baseline="0" dirty="0" smtClean="0">
+                  <a:endParaRPr kumimoji="0" lang="de-DE" sz="2000" b="0" i="0" u="none" strike="noStrike" cap="none" normalizeH="0" baseline="0" dirty="0" smtClean="0">
                     <a:ln>
                       <a:noFill/>
                     </a:ln>
@@ -6623,97 +6785,50 @@
               </p:txBody>
             </p:sp>
           </p:grpSp>
-          <p:cxnSp>
-            <p:nvCxnSpPr>
-              <p:cNvPr id="162" name="Gerade Verbindung mit Pfeil 161"/>
-              <p:cNvCxnSpPr/>
+          <p:sp>
+            <p:nvSpPr>
+              <p:cNvPr id="159" name="Textfeld 158"/>
+              <p:cNvSpPr txBox="1"/>
               <p:nvPr/>
-            </p:nvCxnSpPr>
-            <p:spPr bwMode="auto">
+            </p:nvSpPr>
+            <p:spPr>
               <a:xfrm>
-                <a:off x="1415507" y="3469657"/>
-                <a:ext cx="2236" cy="233354"/>
+                <a:off x="1367142" y="4525174"/>
+                <a:ext cx="355248" cy="374461"/>
               </a:xfrm>
-              <a:prstGeom prst="straightConnector1">
+              <a:prstGeom prst="rect">
                 <a:avLst/>
               </a:prstGeom>
               <a:noFill/>
-              <a:ln w="15875" cap="flat" cmpd="sng" algn="ctr">
-                <a:solidFill>
-                  <a:schemeClr val="accent1"/>
-                </a:solidFill>
-                <a:prstDash val="solid"/>
-                <a:round/>
-                <a:headEnd type="none" w="lg" len="med"/>
-                <a:tailEnd type="none"/>
-              </a:ln>
-              <a:effectLst/>
             </p:spPr>
-          </p:cxnSp>
-          <p:cxnSp>
-            <p:nvCxnSpPr>
-              <p:cNvPr id="166" name="Gerade Verbindung mit Pfeil 165"/>
-              <p:cNvCxnSpPr/>
-              <p:nvPr/>
-            </p:nvCxnSpPr>
-            <p:spPr bwMode="auto">
-              <a:xfrm flipH="1" flipV="1">
-                <a:off x="1711970" y="4072717"/>
-                <a:ext cx="206190" cy="103396"/>
-              </a:xfrm>
-              <a:prstGeom prst="straightConnector1">
-                <a:avLst/>
-              </a:prstGeom>
-              <a:noFill/>
-              <a:ln w="15875" cap="flat" cmpd="sng" algn="ctr">
-                <a:solidFill>
-                  <a:schemeClr val="accent1"/>
-                </a:solidFill>
-                <a:prstDash val="solid"/>
-                <a:round/>
-                <a:headEnd type="none" w="lg" len="med"/>
-                <a:tailEnd type="none"/>
-              </a:ln>
-              <a:effectLst/>
-            </p:spPr>
-          </p:cxnSp>
-          <p:cxnSp>
-            <p:nvCxnSpPr>
-              <p:cNvPr id="167" name="Gerade Verbindung mit Pfeil 166"/>
-              <p:cNvCxnSpPr/>
-              <p:nvPr/>
-            </p:nvCxnSpPr>
-            <p:spPr bwMode="auto">
-              <a:xfrm flipV="1">
-                <a:off x="987713" y="4178870"/>
-                <a:ext cx="219866" cy="110697"/>
-              </a:xfrm>
-              <a:prstGeom prst="straightConnector1">
-                <a:avLst/>
-              </a:prstGeom>
-              <a:noFill/>
-              <a:ln w="15875" cap="flat" cmpd="sng" algn="ctr">
-                <a:solidFill>
-                  <a:schemeClr val="accent1"/>
-                </a:solidFill>
-                <a:prstDash val="solid"/>
-                <a:round/>
-                <a:headEnd type="none" w="lg" len="med"/>
-                <a:tailEnd type="none"/>
-              </a:ln>
-              <a:effectLst/>
-            </p:spPr>
-          </p:cxnSp>
+            <p:txBody>
+              <a:bodyPr wrap="square" rtlCol="0">
+                <a:spAutoFit/>
+              </a:bodyPr>
+              <a:lstStyle/>
+              <a:p>
+                <a:r>
+                  <a:rPr lang="de-DE" sz="1000" dirty="0" smtClean="0"/>
+                  <a:t>α</a:t>
+                </a:r>
+                <a:r>
+                  <a:rPr lang="de-DE" sz="1000" baseline="-25000" dirty="0" smtClean="0"/>
+                  <a:t>1</a:t>
+                </a:r>
+                <a:endParaRPr lang="de-DE" sz="1000" baseline="-25000" dirty="0"/>
+              </a:p>
+            </p:txBody>
+          </p:sp>
           <p:sp>
             <p:nvSpPr>
-              <p:cNvPr id="168" name="Oval 167"/>
+              <p:cNvPr id="186" name="Oval 185"/>
               <p:cNvSpPr/>
               <p:nvPr/>
             </p:nvSpPr>
             <p:spPr bwMode="auto">
               <a:xfrm>
-                <a:off x="1367078" y="3416853"/>
-                <a:ext cx="86095" cy="81583"/>
+                <a:off x="817206" y="5329527"/>
+                <a:ext cx="81521" cy="80643"/>
               </a:xfrm>
               <a:prstGeom prst="ellipse">
                 <a:avLst/>
@@ -6771,607 +6886,506 @@
               </a:p>
             </p:txBody>
           </p:sp>
-        </p:grpSp>
-        <p:sp>
-          <p:nvSpPr>
-            <p:cNvPr id="159" name="Textfeld 158"/>
-            <p:cNvSpPr txBox="1"/>
-            <p:nvPr/>
-          </p:nvSpPr>
-          <p:spPr>
-            <a:xfrm>
-              <a:off x="1316342" y="4494694"/>
-              <a:ext cx="355248" cy="374461"/>
-            </a:xfrm>
-            <a:prstGeom prst="rect">
-              <a:avLst/>
-            </a:prstGeom>
-            <a:noFill/>
-          </p:spPr>
-          <p:txBody>
-            <a:bodyPr wrap="square" rtlCol="0">
-              <a:spAutoFit/>
-            </a:bodyPr>
-            <a:lstStyle/>
-            <a:p>
-              <a:r>
-                <a:rPr lang="de-DE" sz="1000" dirty="0" smtClean="0"/>
-                <a:t>α</a:t>
-              </a:r>
-              <a:r>
-                <a:rPr lang="de-DE" sz="1000" baseline="-25000" dirty="0" smtClean="0"/>
-                <a:t>1</a:t>
-              </a:r>
-              <a:endParaRPr lang="de-DE" sz="1000" baseline="-25000" dirty="0"/>
-            </a:p>
-          </p:txBody>
-        </p:sp>
-        <p:sp>
-          <p:nvSpPr>
-            <p:cNvPr id="186" name="Oval 185"/>
-            <p:cNvSpPr/>
-            <p:nvPr/>
-          </p:nvSpPr>
-          <p:spPr bwMode="auto">
-            <a:xfrm>
-              <a:off x="817206" y="5329527"/>
-              <a:ext cx="81521" cy="80643"/>
-            </a:xfrm>
-            <a:prstGeom prst="ellipse">
-              <a:avLst/>
-            </a:prstGeom>
-            <a:solidFill>
-              <a:schemeClr val="tx1"/>
-            </a:solidFill>
-            <a:ln w="9525" cap="flat" cmpd="sng" algn="ctr">
+          <p:sp>
+            <p:nvSpPr>
+              <p:cNvPr id="187" name="Oval 186"/>
+              <p:cNvSpPr/>
+              <p:nvPr/>
+            </p:nvSpPr>
+            <p:spPr bwMode="auto">
+              <a:xfrm>
+                <a:off x="1700037" y="5217360"/>
+                <a:ext cx="81521" cy="80643"/>
+              </a:xfrm>
+              <a:prstGeom prst="ellipse">
+                <a:avLst/>
+              </a:prstGeom>
               <a:solidFill>
                 <a:schemeClr val="tx1"/>
               </a:solidFill>
-              <a:prstDash val="solid"/>
-              <a:round/>
-              <a:headEnd type="none" w="med" len="med"/>
-              <a:tailEnd type="none" w="med" len="med"/>
-            </a:ln>
-            <a:effectLst/>
-          </p:spPr>
-          <p:txBody>
-            <a:bodyPr vert="horz" wrap="square" lIns="0" tIns="36000" rIns="0" bIns="36000" numCol="1" rtlCol="0" anchor="ctr" anchorCtr="1" compatLnSpc="1">
-              <a:prstTxWarp prst="textNoShape">
+              <a:ln w="9525" cap="flat" cmpd="sng" algn="ctr">
+                <a:solidFill>
+                  <a:schemeClr val="tx1"/>
+                </a:solidFill>
+                <a:prstDash val="solid"/>
+                <a:round/>
+                <a:headEnd type="none" w="med" len="med"/>
+                <a:tailEnd type="none" w="med" len="med"/>
+              </a:ln>
+              <a:effectLst/>
+            </p:spPr>
+            <p:txBody>
+              <a:bodyPr vert="horz" wrap="square" lIns="0" tIns="36000" rIns="0" bIns="36000" numCol="1" rtlCol="0" anchor="ctr" anchorCtr="1" compatLnSpc="1">
+                <a:prstTxWarp prst="textNoShape">
+                  <a:avLst/>
+                </a:prstTxWarp>
+              </a:bodyPr>
+              <a:lstStyle/>
+              <a:p>
+                <a:pPr marL="0" marR="0" indent="0" algn="l" defTabSz="457200" rtl="0" eaLnBrk="1" fontAlgn="base" latinLnBrk="0" hangingPunct="1">
+                  <a:lnSpc>
+                    <a:spcPts val="2400"/>
+                  </a:lnSpc>
+                  <a:spcBef>
+                    <a:spcPts val="600"/>
+                  </a:spcBef>
+                  <a:spcAft>
+                    <a:spcPct val="0"/>
+                  </a:spcAft>
+                  <a:buClr>
+                    <a:srgbClr val="2A6AB3"/>
+                  </a:buClr>
+                  <a:buSzPct val="110000"/>
+                  <a:buFont typeface="Wingdings" pitchFamily="16" charset="2"/>
+                  <a:buNone/>
+                  <a:tabLst/>
+                </a:pPr>
+                <a:endParaRPr kumimoji="0" lang="de-DE" sz="2000" b="0" i="0" u="none" strike="noStrike" cap="none" normalizeH="0" baseline="0" dirty="0" smtClean="0">
+                  <a:ln>
+                    <a:noFill/>
+                  </a:ln>
+                  <a:solidFill>
+                    <a:srgbClr val="000000"/>
+                  </a:solidFill>
+                  <a:effectLst/>
+                  <a:latin typeface="Arial" charset="0"/>
+                </a:endParaRPr>
+              </a:p>
+            </p:txBody>
+          </p:sp>
+          <p:cxnSp>
+            <p:nvCxnSpPr>
+              <p:cNvPr id="26" name="Gerade Verbindung 25"/>
+              <p:cNvCxnSpPr>
+                <a:stCxn id="168" idx="6"/>
+              </p:cNvCxnSpPr>
+              <p:nvPr/>
+            </p:nvCxnSpPr>
+            <p:spPr bwMode="auto">
+              <a:xfrm>
+                <a:off x="1303523" y="4551684"/>
+                <a:ext cx="360831" cy="113"/>
+              </a:xfrm>
+              <a:prstGeom prst="line">
                 <a:avLst/>
-              </a:prstTxWarp>
-            </a:bodyPr>
-            <a:lstStyle/>
-            <a:p>
-              <a:pPr marL="0" marR="0" indent="0" algn="l" defTabSz="457200" rtl="0" eaLnBrk="1" fontAlgn="base" latinLnBrk="0" hangingPunct="1">
-                <a:lnSpc>
-                  <a:spcPts val="2400"/>
-                </a:lnSpc>
-                <a:spcBef>
-                  <a:spcPts val="600"/>
-                </a:spcBef>
-                <a:spcAft>
-                  <a:spcPct val="0"/>
-                </a:spcAft>
-                <a:buClr>
-                  <a:srgbClr val="2A6AB3"/>
-                </a:buClr>
-                <a:buSzPct val="110000"/>
-                <a:buFont typeface="Wingdings" pitchFamily="16" charset="2"/>
-                <a:buNone/>
-                <a:tabLst/>
-              </a:pPr>
-              <a:endParaRPr kumimoji="0" lang="de-DE" sz="2000" b="0" i="0" u="none" strike="noStrike" cap="none" normalizeH="0" baseline="0" dirty="0" smtClean="0">
-                <a:ln>
-                  <a:noFill/>
-                </a:ln>
+              </a:prstGeom>
+              <a:noFill/>
+              <a:ln w="12700" cap="flat" cmpd="sng" algn="ctr">
                 <a:solidFill>
-                  <a:srgbClr val="000000"/>
+                  <a:schemeClr val="accent1"/>
                 </a:solidFill>
-                <a:effectLst/>
-                <a:latin typeface="Arial" charset="0"/>
-              </a:endParaRPr>
-            </a:p>
-          </p:txBody>
-        </p:sp>
-        <p:sp>
-          <p:nvSpPr>
-            <p:cNvPr id="187" name="Oval 186"/>
-            <p:cNvSpPr/>
-            <p:nvPr/>
-          </p:nvSpPr>
-          <p:spPr bwMode="auto">
-            <a:xfrm>
-              <a:off x="1700037" y="5217360"/>
-              <a:ext cx="81521" cy="80643"/>
-            </a:xfrm>
-            <a:prstGeom prst="ellipse">
-              <a:avLst/>
-            </a:prstGeom>
-            <a:solidFill>
-              <a:schemeClr val="tx1"/>
-            </a:solidFill>
-            <a:ln w="9525" cap="flat" cmpd="sng" algn="ctr">
+                <a:prstDash val="solid"/>
+                <a:round/>
+                <a:headEnd type="none" w="lg" len="med"/>
+                <a:tailEnd type="arrow" w="sm" len="lg"/>
+              </a:ln>
+              <a:effectLst/>
+            </p:spPr>
+          </p:cxnSp>
+          <p:cxnSp>
+            <p:nvCxnSpPr>
+              <p:cNvPr id="188" name="Gerade Verbindung 187"/>
+              <p:cNvCxnSpPr/>
+              <p:nvPr/>
+            </p:nvCxnSpPr>
+            <p:spPr bwMode="auto">
+              <a:xfrm flipH="1" flipV="1">
+                <a:off x="662124" y="5116250"/>
+                <a:ext cx="204039" cy="257218"/>
+              </a:xfrm>
+              <a:prstGeom prst="line">
+                <a:avLst/>
+              </a:prstGeom>
+              <a:noFill/>
+              <a:ln w="12700" cap="flat" cmpd="sng" algn="ctr">
+                <a:solidFill>
+                  <a:schemeClr val="accent1"/>
+                </a:solidFill>
+                <a:prstDash val="solid"/>
+                <a:round/>
+                <a:headEnd type="none" w="lg" len="med"/>
+                <a:tailEnd type="arrow" w="sm" len="lg"/>
+              </a:ln>
+              <a:effectLst/>
+            </p:spPr>
+          </p:cxnSp>
+          <p:cxnSp>
+            <p:nvCxnSpPr>
+              <p:cNvPr id="189" name="Gerade Verbindung 188"/>
+              <p:cNvCxnSpPr/>
+              <p:nvPr/>
+            </p:nvCxnSpPr>
+            <p:spPr bwMode="auto">
+              <a:xfrm flipH="1">
+                <a:off x="1516010" y="5257681"/>
+                <a:ext cx="214893" cy="245725"/>
+              </a:xfrm>
+              <a:prstGeom prst="line">
+                <a:avLst/>
+              </a:prstGeom>
+              <a:noFill/>
+              <a:ln w="12700" cap="flat" cmpd="sng" algn="ctr">
+                <a:solidFill>
+                  <a:schemeClr val="accent1"/>
+                </a:solidFill>
+                <a:prstDash val="solid"/>
+                <a:round/>
+                <a:headEnd type="none" w="lg" len="med"/>
+                <a:tailEnd type="arrow" w="sm" len="lg"/>
+              </a:ln>
+              <a:effectLst/>
+            </p:spPr>
+          </p:cxnSp>
+          <p:sp>
+            <p:nvSpPr>
+              <p:cNvPr id="21510" name="Halbbogen 21509"/>
+              <p:cNvSpPr/>
+              <p:nvPr/>
+            </p:nvSpPr>
+            <p:spPr bwMode="auto">
+              <a:xfrm rot="10050603">
+                <a:off x="1022749" y="4407682"/>
+                <a:ext cx="421906" cy="371428"/>
+              </a:xfrm>
+              <a:prstGeom prst="blockArc">
+                <a:avLst>
+                  <a:gd name="adj1" fmla="val 10937022"/>
+                  <a:gd name="adj2" fmla="val 16216229"/>
+                  <a:gd name="adj3" fmla="val 46"/>
+                </a:avLst>
+              </a:prstGeom>
               <a:solidFill>
-                <a:schemeClr val="tx1"/>
+                <a:schemeClr val="bg1"/>
               </a:solidFill>
-              <a:prstDash val="solid"/>
-              <a:round/>
-              <a:headEnd type="none" w="med" len="med"/>
-              <a:tailEnd type="none" w="med" len="med"/>
-            </a:ln>
-            <a:effectLst/>
-          </p:spPr>
-          <p:txBody>
-            <a:bodyPr vert="horz" wrap="square" lIns="0" tIns="36000" rIns="0" bIns="36000" numCol="1" rtlCol="0" anchor="ctr" anchorCtr="1" compatLnSpc="1">
-              <a:prstTxWarp prst="textNoShape">
+              <a:ln w="9525" cap="flat" cmpd="sng" algn="ctr">
+                <a:solidFill>
+                  <a:schemeClr val="tx1"/>
+                </a:solidFill>
+                <a:prstDash val="solid"/>
+                <a:round/>
+                <a:headEnd type="none" w="med" len="med"/>
+                <a:tailEnd type="none" w="med" len="med"/>
+              </a:ln>
+              <a:effectLst/>
+            </p:spPr>
+            <p:txBody>
+              <a:bodyPr vert="horz" wrap="square" lIns="0" tIns="36000" rIns="0" bIns="36000" numCol="1" rtlCol="0" anchor="ctr" anchorCtr="1" compatLnSpc="1">
+                <a:prstTxWarp prst="textNoShape">
+                  <a:avLst/>
+                </a:prstTxWarp>
+              </a:bodyPr>
+              <a:lstStyle/>
+              <a:p>
+                <a:pPr marL="0" marR="0" indent="0" algn="l" defTabSz="457200" rtl="0" eaLnBrk="1" fontAlgn="base" latinLnBrk="0" hangingPunct="1">
+                  <a:lnSpc>
+                    <a:spcPts val="2400"/>
+                  </a:lnSpc>
+                  <a:spcBef>
+                    <a:spcPts val="600"/>
+                  </a:spcBef>
+                  <a:spcAft>
+                    <a:spcPct val="0"/>
+                  </a:spcAft>
+                  <a:buClr>
+                    <a:srgbClr val="2A6AB3"/>
+                  </a:buClr>
+                  <a:buSzPct val="110000"/>
+                  <a:buFont typeface="Wingdings" pitchFamily="16" charset="2"/>
+                  <a:buNone/>
+                  <a:tabLst/>
+                </a:pPr>
+                <a:endParaRPr kumimoji="0" lang="de-DE" sz="2000" b="0" i="0" u="none" strike="noStrike" cap="none" normalizeH="0" baseline="0" dirty="0" smtClean="0">
+                  <a:ln>
+                    <a:noFill/>
+                  </a:ln>
+                  <a:solidFill>
+                    <a:srgbClr val="000000"/>
+                  </a:solidFill>
+                  <a:effectLst/>
+                  <a:latin typeface="Arial" charset="0"/>
+                </a:endParaRPr>
+              </a:p>
+            </p:txBody>
+          </p:sp>
+          <p:sp>
+            <p:nvSpPr>
+              <p:cNvPr id="190" name="Halbbogen 189"/>
+              <p:cNvSpPr/>
+              <p:nvPr/>
+            </p:nvSpPr>
+            <p:spPr bwMode="auto">
+              <a:xfrm rot="2909734">
+                <a:off x="745019" y="5279888"/>
+                <a:ext cx="279311" cy="211728"/>
+              </a:xfrm>
+              <a:prstGeom prst="blockArc">
+                <a:avLst>
+                  <a:gd name="adj1" fmla="val 10937022"/>
+                  <a:gd name="adj2" fmla="val 16216229"/>
+                  <a:gd name="adj3" fmla="val 46"/>
+                </a:avLst>
+              </a:prstGeom>
+              <a:solidFill>
+                <a:schemeClr val="bg1"/>
+              </a:solidFill>
+              <a:ln w="9525" cap="flat" cmpd="sng" algn="ctr">
+                <a:solidFill>
+                  <a:schemeClr val="tx1"/>
+                </a:solidFill>
+                <a:prstDash val="solid"/>
+                <a:round/>
+                <a:headEnd type="none" w="med" len="med"/>
+                <a:tailEnd type="none" w="med" len="med"/>
+              </a:ln>
+              <a:effectLst/>
+            </p:spPr>
+            <p:txBody>
+              <a:bodyPr vert="horz" wrap="square" lIns="0" tIns="36000" rIns="0" bIns="36000" numCol="1" rtlCol="0" anchor="ctr" anchorCtr="1" compatLnSpc="1">
+                <a:prstTxWarp prst="textNoShape">
+                  <a:avLst/>
+                </a:prstTxWarp>
+              </a:bodyPr>
+              <a:lstStyle/>
+              <a:p>
+                <a:pPr marL="0" marR="0" indent="0" algn="l" defTabSz="457200" rtl="0" eaLnBrk="1" fontAlgn="base" latinLnBrk="0" hangingPunct="1">
+                  <a:lnSpc>
+                    <a:spcPts val="2400"/>
+                  </a:lnSpc>
+                  <a:spcBef>
+                    <a:spcPts val="600"/>
+                  </a:spcBef>
+                  <a:spcAft>
+                    <a:spcPct val="0"/>
+                  </a:spcAft>
+                  <a:buClr>
+                    <a:srgbClr val="2A6AB3"/>
+                  </a:buClr>
+                  <a:buSzPct val="110000"/>
+                  <a:buFont typeface="Wingdings" pitchFamily="16" charset="2"/>
+                  <a:buNone/>
+                  <a:tabLst/>
+                </a:pPr>
+                <a:endParaRPr kumimoji="0" lang="de-DE" sz="2000" b="0" i="0" u="none" strike="noStrike" cap="none" normalizeH="0" baseline="0" dirty="0" smtClean="0">
+                  <a:ln>
+                    <a:noFill/>
+                  </a:ln>
+                  <a:solidFill>
+                    <a:srgbClr val="000000"/>
+                  </a:solidFill>
+                  <a:effectLst/>
+                  <a:latin typeface="Arial" charset="0"/>
+                </a:endParaRPr>
+              </a:p>
+            </p:txBody>
+          </p:sp>
+          <p:sp>
+            <p:nvSpPr>
+              <p:cNvPr id="191" name="Halbbogen 190"/>
+              <p:cNvSpPr/>
+              <p:nvPr/>
+            </p:nvSpPr>
+            <p:spPr bwMode="auto">
+              <a:xfrm rot="16815010">
+                <a:off x="1555258" y="5091828"/>
+                <a:ext cx="264525" cy="225655"/>
+              </a:xfrm>
+              <a:prstGeom prst="blockArc">
+                <a:avLst>
+                  <a:gd name="adj1" fmla="val 10937022"/>
+                  <a:gd name="adj2" fmla="val 16216229"/>
+                  <a:gd name="adj3" fmla="val 46"/>
+                </a:avLst>
+              </a:prstGeom>
+              <a:solidFill>
+                <a:schemeClr val="bg1"/>
+              </a:solidFill>
+              <a:ln w="9525" cap="flat" cmpd="sng" algn="ctr">
+                <a:solidFill>
+                  <a:schemeClr val="tx1"/>
+                </a:solidFill>
+                <a:prstDash val="solid"/>
+                <a:round/>
+                <a:headEnd type="none" w="med" len="med"/>
+                <a:tailEnd type="none" w="med" len="med"/>
+              </a:ln>
+              <a:effectLst/>
+            </p:spPr>
+            <p:txBody>
+              <a:bodyPr vert="horz" wrap="square" lIns="0" tIns="36000" rIns="0" bIns="36000" numCol="1" rtlCol="0" anchor="ctr" anchorCtr="1" compatLnSpc="1">
+                <a:prstTxWarp prst="textNoShape">
+                  <a:avLst/>
+                </a:prstTxWarp>
+              </a:bodyPr>
+              <a:lstStyle/>
+              <a:p>
+                <a:pPr marL="0" marR="0" indent="0" algn="l" defTabSz="457200" rtl="0" eaLnBrk="1" fontAlgn="base" latinLnBrk="0" hangingPunct="1">
+                  <a:lnSpc>
+                    <a:spcPts val="2400"/>
+                  </a:lnSpc>
+                  <a:spcBef>
+                    <a:spcPts val="600"/>
+                  </a:spcBef>
+                  <a:spcAft>
+                    <a:spcPct val="0"/>
+                  </a:spcAft>
+                  <a:buClr>
+                    <a:srgbClr val="2A6AB3"/>
+                  </a:buClr>
+                  <a:buSzPct val="110000"/>
+                  <a:buFont typeface="Wingdings" pitchFamily="16" charset="2"/>
+                  <a:buNone/>
+                  <a:tabLst/>
+                </a:pPr>
+                <a:endParaRPr kumimoji="0" lang="de-DE" sz="2000" b="0" i="0" u="none" strike="noStrike" cap="none" normalizeH="0" baseline="0" dirty="0" smtClean="0">
+                  <a:ln>
+                    <a:noFill/>
+                  </a:ln>
+                  <a:solidFill>
+                    <a:srgbClr val="000000"/>
+                  </a:solidFill>
+                  <a:effectLst/>
+                  <a:latin typeface="Arial" charset="0"/>
+                </a:endParaRPr>
+              </a:p>
+            </p:txBody>
+          </p:sp>
+          <p:sp>
+            <p:nvSpPr>
+              <p:cNvPr id="192" name="Textfeld 191"/>
+              <p:cNvSpPr txBox="1"/>
+              <p:nvPr/>
+            </p:nvSpPr>
+            <p:spPr>
+              <a:xfrm>
+                <a:off x="1274605" y="5042878"/>
+                <a:ext cx="355248" cy="374461"/>
+              </a:xfrm>
+              <a:prstGeom prst="rect">
                 <a:avLst/>
-              </a:prstTxWarp>
-            </a:bodyPr>
-            <a:lstStyle/>
-            <a:p>
-              <a:pPr marL="0" marR="0" indent="0" algn="l" defTabSz="457200" rtl="0" eaLnBrk="1" fontAlgn="base" latinLnBrk="0" hangingPunct="1">
-                <a:lnSpc>
-                  <a:spcPts val="2400"/>
-                </a:lnSpc>
-                <a:spcBef>
-                  <a:spcPts val="600"/>
-                </a:spcBef>
-                <a:spcAft>
-                  <a:spcPct val="0"/>
-                </a:spcAft>
-                <a:buClr>
-                  <a:srgbClr val="2A6AB3"/>
-                </a:buClr>
-                <a:buSzPct val="110000"/>
-                <a:buFont typeface="Wingdings" pitchFamily="16" charset="2"/>
-                <a:buNone/>
-                <a:tabLst/>
-              </a:pPr>
-              <a:endParaRPr kumimoji="0" lang="de-DE" sz="2000" b="0" i="0" u="none" strike="noStrike" cap="none" normalizeH="0" baseline="0" dirty="0" smtClean="0">
-                <a:ln>
-                  <a:noFill/>
-                </a:ln>
-                <a:solidFill>
-                  <a:srgbClr val="000000"/>
-                </a:solidFill>
-                <a:effectLst/>
-                <a:latin typeface="Arial" charset="0"/>
-              </a:endParaRPr>
-            </a:p>
-          </p:txBody>
-        </p:sp>
-        <p:cxnSp>
-          <p:nvCxnSpPr>
-            <p:cNvPr id="26" name="Gerade Verbindung 25"/>
-            <p:cNvCxnSpPr>
-              <a:stCxn id="168" idx="6"/>
-            </p:cNvCxnSpPr>
-            <p:nvPr/>
-          </p:nvCxnSpPr>
-          <p:spPr bwMode="auto">
-            <a:xfrm>
-              <a:off x="1303523" y="4551684"/>
-              <a:ext cx="360831" cy="113"/>
-            </a:xfrm>
-            <a:prstGeom prst="line">
-              <a:avLst/>
-            </a:prstGeom>
-            <a:noFill/>
-            <a:ln w="12700" cap="flat" cmpd="sng" algn="ctr">
-              <a:solidFill>
-                <a:schemeClr val="accent1"/>
-              </a:solidFill>
-              <a:prstDash val="solid"/>
-              <a:round/>
-              <a:headEnd type="none" w="lg" len="med"/>
-              <a:tailEnd type="arrow" w="sm" len="lg"/>
-            </a:ln>
-            <a:effectLst/>
-          </p:spPr>
-        </p:cxnSp>
-        <p:cxnSp>
-          <p:nvCxnSpPr>
-            <p:cNvPr id="188" name="Gerade Verbindung 187"/>
-            <p:cNvCxnSpPr/>
-            <p:nvPr/>
-          </p:nvCxnSpPr>
-          <p:spPr bwMode="auto">
-            <a:xfrm flipH="1" flipV="1">
-              <a:off x="662124" y="5116250"/>
-              <a:ext cx="204039" cy="257218"/>
-            </a:xfrm>
-            <a:prstGeom prst="line">
-              <a:avLst/>
-            </a:prstGeom>
-            <a:noFill/>
-            <a:ln w="12700" cap="flat" cmpd="sng" algn="ctr">
-              <a:solidFill>
-                <a:schemeClr val="accent1"/>
-              </a:solidFill>
-              <a:prstDash val="solid"/>
-              <a:round/>
-              <a:headEnd type="none" w="lg" len="med"/>
-              <a:tailEnd type="arrow" w="sm" len="lg"/>
-            </a:ln>
-            <a:effectLst/>
-          </p:spPr>
-        </p:cxnSp>
-        <p:cxnSp>
-          <p:nvCxnSpPr>
-            <p:cNvPr id="189" name="Gerade Verbindung 188"/>
-            <p:cNvCxnSpPr/>
-            <p:nvPr/>
-          </p:nvCxnSpPr>
-          <p:spPr bwMode="auto">
-            <a:xfrm flipH="1">
-              <a:off x="1516010" y="5257681"/>
-              <a:ext cx="214893" cy="245725"/>
-            </a:xfrm>
-            <a:prstGeom prst="line">
-              <a:avLst/>
-            </a:prstGeom>
-            <a:noFill/>
-            <a:ln w="12700" cap="flat" cmpd="sng" algn="ctr">
-              <a:solidFill>
-                <a:schemeClr val="accent1"/>
-              </a:solidFill>
-              <a:prstDash val="solid"/>
-              <a:round/>
-              <a:headEnd type="none" w="lg" len="med"/>
-              <a:tailEnd type="arrow" w="sm" len="lg"/>
-            </a:ln>
-            <a:effectLst/>
-          </p:spPr>
-        </p:cxnSp>
-        <p:sp>
-          <p:nvSpPr>
-            <p:cNvPr id="21510" name="Halbbogen 21509"/>
-            <p:cNvSpPr/>
-            <p:nvPr/>
-          </p:nvSpPr>
-          <p:spPr bwMode="auto">
-            <a:xfrm rot="10050603">
-              <a:off x="1022749" y="4407682"/>
-              <a:ext cx="421906" cy="371428"/>
-            </a:xfrm>
-            <a:prstGeom prst="blockArc">
-              <a:avLst>
-                <a:gd name="adj1" fmla="val 10937022"/>
-                <a:gd name="adj2" fmla="val 16216229"/>
-                <a:gd name="adj3" fmla="val 46"/>
-              </a:avLst>
-            </a:prstGeom>
-            <a:solidFill>
-              <a:schemeClr val="bg1"/>
-            </a:solidFill>
-            <a:ln w="9525" cap="flat" cmpd="sng" algn="ctr">
-              <a:solidFill>
-                <a:schemeClr val="tx1"/>
-              </a:solidFill>
-              <a:prstDash val="solid"/>
-              <a:round/>
-              <a:headEnd type="none" w="med" len="med"/>
-              <a:tailEnd type="none" w="med" len="med"/>
-            </a:ln>
-            <a:effectLst/>
-          </p:spPr>
-          <p:txBody>
-            <a:bodyPr vert="horz" wrap="square" lIns="0" tIns="36000" rIns="0" bIns="36000" numCol="1" rtlCol="0" anchor="ctr" anchorCtr="1" compatLnSpc="1">
-              <a:prstTxWarp prst="textNoShape">
+              </a:prstGeom>
+              <a:noFill/>
+            </p:spPr>
+            <p:txBody>
+              <a:bodyPr wrap="square" rtlCol="0">
+                <a:spAutoFit/>
+              </a:bodyPr>
+              <a:lstStyle/>
+              <a:p>
+                <a:r>
+                  <a:rPr lang="de-DE" sz="1000" dirty="0" smtClean="0"/>
+                  <a:t>α</a:t>
+                </a:r>
+                <a:r>
+                  <a:rPr lang="de-DE" sz="1000" baseline="-25000" dirty="0" smtClean="0"/>
+                  <a:t>2</a:t>
+                </a:r>
+                <a:endParaRPr lang="de-DE" sz="1000" baseline="-25000" dirty="0"/>
+              </a:p>
+            </p:txBody>
+          </p:sp>
+          <p:sp>
+            <p:nvSpPr>
+              <p:cNvPr id="193" name="Textfeld 192"/>
+              <p:cNvSpPr txBox="1"/>
+              <p:nvPr/>
+            </p:nvSpPr>
+            <p:spPr>
+              <a:xfrm>
+                <a:off x="774493" y="4871860"/>
+                <a:ext cx="355248" cy="374461"/>
+              </a:xfrm>
+              <a:prstGeom prst="rect">
                 <a:avLst/>
-              </a:prstTxWarp>
-            </a:bodyPr>
-            <a:lstStyle/>
-            <a:p>
-              <a:pPr marL="0" marR="0" indent="0" algn="l" defTabSz="457200" rtl="0" eaLnBrk="1" fontAlgn="base" latinLnBrk="0" hangingPunct="1">
-                <a:lnSpc>
-                  <a:spcPts val="2400"/>
-                </a:lnSpc>
-                <a:spcBef>
-                  <a:spcPts val="600"/>
-                </a:spcBef>
-                <a:spcAft>
-                  <a:spcPct val="0"/>
-                </a:spcAft>
-                <a:buClr>
-                  <a:srgbClr val="2A6AB3"/>
-                </a:buClr>
-                <a:buSzPct val="110000"/>
-                <a:buFont typeface="Wingdings" pitchFamily="16" charset="2"/>
-                <a:buNone/>
-                <a:tabLst/>
-              </a:pPr>
-              <a:endParaRPr kumimoji="0" lang="de-DE" sz="2000" b="0" i="0" u="none" strike="noStrike" cap="none" normalizeH="0" baseline="0" dirty="0" smtClean="0">
-                <a:ln>
-                  <a:noFill/>
-                </a:ln>
-                <a:solidFill>
-                  <a:srgbClr val="000000"/>
-                </a:solidFill>
-                <a:effectLst/>
-                <a:latin typeface="Arial" charset="0"/>
-              </a:endParaRPr>
-            </a:p>
-          </p:txBody>
-        </p:sp>
-        <p:sp>
-          <p:nvSpPr>
-            <p:cNvPr id="190" name="Halbbogen 189"/>
-            <p:cNvSpPr/>
-            <p:nvPr/>
-          </p:nvSpPr>
-          <p:spPr bwMode="auto">
-            <a:xfrm rot="2909734">
-              <a:off x="745019" y="5279888"/>
-              <a:ext cx="279311" cy="211728"/>
-            </a:xfrm>
-            <a:prstGeom prst="blockArc">
-              <a:avLst>
-                <a:gd name="adj1" fmla="val 10937022"/>
-                <a:gd name="adj2" fmla="val 16216229"/>
-                <a:gd name="adj3" fmla="val 46"/>
-              </a:avLst>
-            </a:prstGeom>
-            <a:solidFill>
-              <a:schemeClr val="bg1"/>
-            </a:solidFill>
-            <a:ln w="9525" cap="flat" cmpd="sng" algn="ctr">
-              <a:solidFill>
-                <a:schemeClr val="tx1"/>
-              </a:solidFill>
-              <a:prstDash val="solid"/>
-              <a:round/>
-              <a:headEnd type="none" w="med" len="med"/>
-              <a:tailEnd type="none" w="med" len="med"/>
-            </a:ln>
-            <a:effectLst/>
-          </p:spPr>
-          <p:txBody>
-            <a:bodyPr vert="horz" wrap="square" lIns="0" tIns="36000" rIns="0" bIns="36000" numCol="1" rtlCol="0" anchor="ctr" anchorCtr="1" compatLnSpc="1">
-              <a:prstTxWarp prst="textNoShape">
+              </a:prstGeom>
+              <a:noFill/>
+            </p:spPr>
+            <p:txBody>
+              <a:bodyPr wrap="square" rtlCol="0">
+                <a:spAutoFit/>
+              </a:bodyPr>
+              <a:lstStyle/>
+              <a:p>
+                <a:r>
+                  <a:rPr lang="de-DE" sz="1000" dirty="0" smtClean="0"/>
+                  <a:t>α</a:t>
+                </a:r>
+                <a:r>
+                  <a:rPr lang="de-DE" sz="1000" baseline="-25000" dirty="0" smtClean="0"/>
+                  <a:t>3</a:t>
+                </a:r>
+                <a:endParaRPr lang="de-DE" sz="1000" baseline="-25000" dirty="0"/>
+              </a:p>
+            </p:txBody>
+          </p:sp>
+          <p:sp>
+            <p:nvSpPr>
+              <p:cNvPr id="194" name="Textfeld 193"/>
+              <p:cNvSpPr txBox="1"/>
+              <p:nvPr/>
+            </p:nvSpPr>
+            <p:spPr>
+              <a:xfrm>
+                <a:off x="1302100" y="5290215"/>
+                <a:ext cx="357101" cy="374461"/>
+              </a:xfrm>
+              <a:prstGeom prst="rect">
                 <a:avLst/>
-              </a:prstTxWarp>
-            </a:bodyPr>
-            <a:lstStyle/>
-            <a:p>
-              <a:pPr marL="0" marR="0" indent="0" algn="l" defTabSz="457200" rtl="0" eaLnBrk="1" fontAlgn="base" latinLnBrk="0" hangingPunct="1">
-                <a:lnSpc>
-                  <a:spcPts val="2400"/>
-                </a:lnSpc>
-                <a:spcBef>
-                  <a:spcPts val="600"/>
-                </a:spcBef>
-                <a:spcAft>
-                  <a:spcPct val="0"/>
-                </a:spcAft>
-                <a:buClr>
-                  <a:srgbClr val="2A6AB3"/>
-                </a:buClr>
-                <a:buSzPct val="110000"/>
-                <a:buFont typeface="Wingdings" pitchFamily="16" charset="2"/>
-                <a:buNone/>
-                <a:tabLst/>
-              </a:pPr>
-              <a:endParaRPr kumimoji="0" lang="de-DE" sz="2000" b="0" i="0" u="none" strike="noStrike" cap="none" normalizeH="0" baseline="0" dirty="0" smtClean="0">
-                <a:ln>
-                  <a:noFill/>
-                </a:ln>
-                <a:solidFill>
-                  <a:srgbClr val="000000"/>
-                </a:solidFill>
-                <a:effectLst/>
-                <a:latin typeface="Arial" charset="0"/>
-              </a:endParaRPr>
-            </a:p>
-          </p:txBody>
-        </p:sp>
-        <p:sp>
-          <p:nvSpPr>
-            <p:cNvPr id="191" name="Halbbogen 190"/>
-            <p:cNvSpPr/>
-            <p:nvPr/>
-          </p:nvSpPr>
-          <p:spPr bwMode="auto">
-            <a:xfrm rot="16815010">
-              <a:off x="1555258" y="5091828"/>
-              <a:ext cx="264525" cy="225655"/>
-            </a:xfrm>
-            <a:prstGeom prst="blockArc">
-              <a:avLst>
-                <a:gd name="adj1" fmla="val 10937022"/>
-                <a:gd name="adj2" fmla="val 16216229"/>
-                <a:gd name="adj3" fmla="val 46"/>
-              </a:avLst>
-            </a:prstGeom>
-            <a:solidFill>
-              <a:schemeClr val="bg1"/>
-            </a:solidFill>
-            <a:ln w="9525" cap="flat" cmpd="sng" algn="ctr">
-              <a:solidFill>
-                <a:schemeClr val="tx1"/>
-              </a:solidFill>
-              <a:prstDash val="solid"/>
-              <a:round/>
-              <a:headEnd type="none" w="med" len="med"/>
-              <a:tailEnd type="none" w="med" len="med"/>
-            </a:ln>
-            <a:effectLst/>
-          </p:spPr>
-          <p:txBody>
-            <a:bodyPr vert="horz" wrap="square" lIns="0" tIns="36000" rIns="0" bIns="36000" numCol="1" rtlCol="0" anchor="ctr" anchorCtr="1" compatLnSpc="1">
-              <a:prstTxWarp prst="textNoShape">
+              </a:prstGeom>
+              <a:noFill/>
+            </p:spPr>
+            <p:txBody>
+              <a:bodyPr wrap="square" rtlCol="0">
+                <a:spAutoFit/>
+              </a:bodyPr>
+              <a:lstStyle/>
+              <a:p>
+                <a:r>
+                  <a:rPr lang="de-DE" sz="1000" dirty="0" smtClean="0"/>
+                  <a:t>T</a:t>
+                </a:r>
+                <a:r>
+                  <a:rPr lang="de-DE" sz="1000" baseline="-25000" dirty="0" smtClean="0"/>
+                  <a:t>2</a:t>
+                </a:r>
+                <a:endParaRPr lang="de-DE" sz="1000" baseline="-25000" dirty="0"/>
+              </a:p>
+            </p:txBody>
+          </p:sp>
+          <p:sp>
+            <p:nvSpPr>
+              <p:cNvPr id="195" name="Textfeld 194"/>
+              <p:cNvSpPr txBox="1"/>
+              <p:nvPr/>
+            </p:nvSpPr>
+            <p:spPr>
+              <a:xfrm>
+                <a:off x="420142" y="4789214"/>
+                <a:ext cx="357101" cy="374461"/>
+              </a:xfrm>
+              <a:prstGeom prst="rect">
                 <a:avLst/>
-              </a:prstTxWarp>
-            </a:bodyPr>
-            <a:lstStyle/>
-            <a:p>
-              <a:pPr marL="0" marR="0" indent="0" algn="l" defTabSz="457200" rtl="0" eaLnBrk="1" fontAlgn="base" latinLnBrk="0" hangingPunct="1">
-                <a:lnSpc>
-                  <a:spcPts val="2400"/>
-                </a:lnSpc>
-                <a:spcBef>
-                  <a:spcPts val="600"/>
-                </a:spcBef>
-                <a:spcAft>
-                  <a:spcPct val="0"/>
-                </a:spcAft>
-                <a:buClr>
-                  <a:srgbClr val="2A6AB3"/>
-                </a:buClr>
-                <a:buSzPct val="110000"/>
-                <a:buFont typeface="Wingdings" pitchFamily="16" charset="2"/>
-                <a:buNone/>
-                <a:tabLst/>
-              </a:pPr>
-              <a:endParaRPr kumimoji="0" lang="de-DE" sz="2000" b="0" i="0" u="none" strike="noStrike" cap="none" normalizeH="0" baseline="0" dirty="0" smtClean="0">
-                <a:ln>
-                  <a:noFill/>
-                </a:ln>
-                <a:solidFill>
-                  <a:srgbClr val="000000"/>
-                </a:solidFill>
-                <a:effectLst/>
-                <a:latin typeface="Arial" charset="0"/>
-              </a:endParaRPr>
-            </a:p>
-          </p:txBody>
-        </p:sp>
-        <p:sp>
-          <p:nvSpPr>
-            <p:cNvPr id="192" name="Textfeld 191"/>
-            <p:cNvSpPr txBox="1"/>
-            <p:nvPr/>
-          </p:nvSpPr>
-          <p:spPr>
-            <a:xfrm>
-              <a:off x="1345725" y="5063198"/>
-              <a:ext cx="355248" cy="374461"/>
-            </a:xfrm>
-            <a:prstGeom prst="rect">
-              <a:avLst/>
-            </a:prstGeom>
-            <a:noFill/>
-          </p:spPr>
-          <p:txBody>
-            <a:bodyPr wrap="square" rtlCol="0">
-              <a:spAutoFit/>
-            </a:bodyPr>
-            <a:lstStyle/>
-            <a:p>
-              <a:r>
-                <a:rPr lang="de-DE" sz="1000" dirty="0" smtClean="0"/>
-                <a:t>α</a:t>
-              </a:r>
-              <a:r>
-                <a:rPr lang="de-DE" sz="1000" baseline="-25000" dirty="0" smtClean="0"/>
-                <a:t>2</a:t>
-              </a:r>
-              <a:endParaRPr lang="de-DE" sz="1000" baseline="-25000" dirty="0"/>
-            </a:p>
-          </p:txBody>
-        </p:sp>
-        <p:sp>
-          <p:nvSpPr>
-            <p:cNvPr id="193" name="Textfeld 192"/>
-            <p:cNvSpPr txBox="1"/>
-            <p:nvPr/>
-          </p:nvSpPr>
-          <p:spPr>
-            <a:xfrm>
-              <a:off x="774493" y="4871860"/>
-              <a:ext cx="355248" cy="374461"/>
-            </a:xfrm>
-            <a:prstGeom prst="rect">
-              <a:avLst/>
-            </a:prstGeom>
-            <a:noFill/>
-          </p:spPr>
-          <p:txBody>
-            <a:bodyPr wrap="square" rtlCol="0">
-              <a:spAutoFit/>
-            </a:bodyPr>
-            <a:lstStyle/>
-            <a:p>
-              <a:r>
-                <a:rPr lang="de-DE" sz="1000" dirty="0" smtClean="0"/>
-                <a:t>α</a:t>
-              </a:r>
-              <a:r>
-                <a:rPr lang="de-DE" sz="1000" baseline="-25000" dirty="0" smtClean="0"/>
-                <a:t>3</a:t>
-              </a:r>
-              <a:endParaRPr lang="de-DE" sz="1000" baseline="-25000" dirty="0"/>
-            </a:p>
-          </p:txBody>
-        </p:sp>
-        <p:sp>
-          <p:nvSpPr>
-            <p:cNvPr id="194" name="Textfeld 193"/>
-            <p:cNvSpPr txBox="1"/>
-            <p:nvPr/>
-          </p:nvSpPr>
-          <p:spPr>
-            <a:xfrm>
-              <a:off x="1484980" y="5341015"/>
-              <a:ext cx="357101" cy="374461"/>
-            </a:xfrm>
-            <a:prstGeom prst="rect">
-              <a:avLst/>
-            </a:prstGeom>
-            <a:noFill/>
-          </p:spPr>
-          <p:txBody>
-            <a:bodyPr wrap="square" rtlCol="0">
-              <a:spAutoFit/>
-            </a:bodyPr>
-            <a:lstStyle/>
-            <a:p>
-              <a:r>
-                <a:rPr lang="de-DE" sz="1000" dirty="0" smtClean="0"/>
-                <a:t>T</a:t>
-              </a:r>
-              <a:r>
-                <a:rPr lang="de-DE" sz="1000" baseline="-25000" dirty="0" smtClean="0"/>
-                <a:t>2</a:t>
-              </a:r>
-              <a:endParaRPr lang="de-DE" sz="1000" baseline="-25000" dirty="0"/>
-            </a:p>
-          </p:txBody>
-        </p:sp>
-        <p:sp>
-          <p:nvSpPr>
-            <p:cNvPr id="195" name="Textfeld 194"/>
-            <p:cNvSpPr txBox="1"/>
-            <p:nvPr/>
-          </p:nvSpPr>
-          <p:spPr>
-            <a:xfrm>
-              <a:off x="450622" y="5073694"/>
-              <a:ext cx="357101" cy="374461"/>
-            </a:xfrm>
-            <a:prstGeom prst="rect">
-              <a:avLst/>
-            </a:prstGeom>
-            <a:noFill/>
-          </p:spPr>
-          <p:txBody>
-            <a:bodyPr wrap="square" rtlCol="0">
-              <a:spAutoFit/>
-            </a:bodyPr>
-            <a:lstStyle/>
-            <a:p>
-              <a:r>
-                <a:rPr lang="de-DE" sz="1000" dirty="0" smtClean="0"/>
-                <a:t>T</a:t>
-              </a:r>
-              <a:r>
-                <a:rPr lang="de-DE" sz="1000" baseline="-25000" dirty="0" smtClean="0"/>
-                <a:t>3</a:t>
-              </a:r>
-              <a:endParaRPr lang="de-DE" sz="1000" baseline="-25000" dirty="0"/>
-            </a:p>
-          </p:txBody>
-        </p:sp>
+              </a:prstGeom>
+              <a:noFill/>
+            </p:spPr>
+            <p:txBody>
+              <a:bodyPr wrap="square" rtlCol="0">
+                <a:spAutoFit/>
+              </a:bodyPr>
+              <a:lstStyle/>
+              <a:p>
+                <a:r>
+                  <a:rPr lang="de-DE" sz="1000" dirty="0" smtClean="0"/>
+                  <a:t>T</a:t>
+                </a:r>
+                <a:r>
+                  <a:rPr lang="de-DE" sz="1000" baseline="-25000" dirty="0" smtClean="0"/>
+                  <a:t>3</a:t>
+                </a:r>
+                <a:endParaRPr lang="de-DE" sz="1000" baseline="-25000" dirty="0"/>
+              </a:p>
+            </p:txBody>
+          </p:sp>
+        </p:grpSp>
       </p:grpSp>
       <p:sp>
         <p:nvSpPr>
@@ -7428,9 +7442,9 @@
         <p:grpSpPr>
           <a:xfrm>
             <a:off x="4189052" y="3474100"/>
-            <a:ext cx="2711151" cy="3129900"/>
+            <a:ext cx="2863551" cy="3129900"/>
             <a:chOff x="4209372" y="3453780"/>
-            <a:chExt cx="2711151" cy="3129900"/>
+            <a:chExt cx="2863551" cy="3129900"/>
           </a:xfrm>
         </p:grpSpPr>
         <p:cxnSp>
@@ -8521,7 +8535,7 @@
             </p:nvSpPr>
             <p:spPr>
               <a:xfrm>
-                <a:off x="1587030" y="3505389"/>
+                <a:off x="1666073" y="3526879"/>
                 <a:ext cx="407617" cy="374461"/>
               </a:xfrm>
               <a:prstGeom prst="rect">
@@ -8559,7 +8573,7 @@
             </p:nvSpPr>
             <p:spPr>
               <a:xfrm>
-                <a:off x="1634841" y="3762375"/>
+                <a:off x="1595721" y="3911062"/>
                 <a:ext cx="407617" cy="374461"/>
               </a:xfrm>
               <a:prstGeom prst="rect">
@@ -8597,7 +8611,7 @@
             </p:nvSpPr>
             <p:spPr>
               <a:xfrm>
-                <a:off x="1358430" y="3986494"/>
+                <a:off x="1039053" y="4042007"/>
                 <a:ext cx="407617" cy="374461"/>
               </a:xfrm>
               <a:prstGeom prst="rect">
@@ -8703,7 +8717,7 @@
           </p:nvSpPr>
           <p:spPr>
             <a:xfrm>
-              <a:off x="5366043" y="4577862"/>
+              <a:off x="5518443" y="4699782"/>
               <a:ext cx="1554480" cy="389850"/>
             </a:xfrm>
             <a:prstGeom prst="rect">
@@ -8719,7 +8733,7 @@
             <a:p>
               <a:r>
                 <a:rPr lang="de-DE" sz="1200" dirty="0" err="1" smtClean="0"/>
-                <a:t>Camera</a:t>
+                <a:t>camera</a:t>
               </a:r>
               <a:r>
                 <a:rPr lang="de-DE" sz="1200" dirty="0" smtClean="0"/>

</xml_diff>